<commit_message>
Figure numbers are added
</commit_message>
<xml_diff>
--- a/Presentations/464_FB_vs3.pptx
+++ b/Presentations/464_FB_vs3.pptx
@@ -6880,7 +6880,7 @@
             </a:r>
             <a:r>
               <a:rPr lang="tr-TR" sz="1400" dirty="0"/>
-              <a:t>. X</a:t>
+              <a:t>. 4</a:t>
             </a:r>
             <a:r>
               <a:rPr lang="tr-TR" sz="1600" dirty="0"/>
@@ -7059,7 +7059,7 @@
             </a:r>
             <a:r>
               <a:rPr lang="tr-TR" sz="1400" dirty="0"/>
-              <a:t>. X </a:t>
+              <a:t>. 5 </a:t>
             </a:r>
             <a:r>
               <a:rPr lang="tr-TR" sz="1200" dirty="0" err="1"/>
@@ -10048,7 +10048,7 @@
             </a:r>
             <a:r>
               <a:rPr lang="tr-TR" sz="1400" dirty="0"/>
-              <a:t>. X </a:t>
+              <a:t>. 1 </a:t>
             </a:r>
             <a:r>
               <a:rPr lang="tr-TR" sz="1200" dirty="0" err="1"/>
@@ -10101,7 +10101,7 @@
             </a:r>
             <a:r>
               <a:rPr lang="tr-TR" sz="1400" dirty="0"/>
-              <a:t>. X </a:t>
+              <a:t>. 2 </a:t>
             </a:r>
             <a:r>
               <a:rPr lang="tr-TR" sz="1200" dirty="0" err="1"/>
@@ -11372,6 +11372,95 @@
           </a:p>
         </p:txBody>
       </p:sp>
+      <p:sp>
+        <p:nvSpPr>
+          <p:cNvPr id="9" name="Metin kutusu 8">
+            <a:extLst>
+              <a:ext uri="{FF2B5EF4-FFF2-40B4-BE49-F238E27FC236}">
+                <a16:creationId xmlns:a16="http://schemas.microsoft.com/office/drawing/2014/main" id="{CCAABF98-ED5D-4434-85A6-3FDA6702BE80}"/>
+              </a:ext>
+            </a:extLst>
+          </p:cNvPr>
+          <p:cNvSpPr txBox="1"/>
+          <p:nvPr/>
+        </p:nvSpPr>
+        <p:spPr>
+          <a:xfrm>
+            <a:off x="1828799" y="5851926"/>
+            <a:ext cx="7964129" cy="338554"/>
+          </a:xfrm>
+          <a:prstGeom prst="rect">
+            <a:avLst/>
+          </a:prstGeom>
+          <a:noFill/>
+        </p:spPr>
+        <p:txBody>
+          <a:bodyPr wrap="square" rtlCol="0">
+            <a:spAutoFit/>
+          </a:bodyPr>
+          <a:lstStyle/>
+          <a:p>
+            <a:pPr algn="ctr"/>
+            <a:r>
+              <a:rPr lang="tr-TR" sz="1400" dirty="0" err="1"/>
+              <a:t>Fig</a:t>
+            </a:r>
+            <a:r>
+              <a:rPr lang="tr-TR" sz="1400" dirty="0"/>
+              <a:t>. 5</a:t>
+            </a:r>
+            <a:r>
+              <a:rPr lang="tr-TR" sz="1600" dirty="0"/>
+              <a:t> NI limit </a:t>
+            </a:r>
+            <a:r>
+              <a:rPr lang="tr-TR" sz="1600" dirty="0" err="1"/>
+              <a:t>and</a:t>
+            </a:r>
+            <a:r>
+              <a:rPr lang="tr-TR" sz="1600" dirty="0"/>
+              <a:t> </a:t>
+            </a:r>
+            <a:r>
+              <a:rPr lang="tr-TR" sz="1600" dirty="0" err="1"/>
+              <a:t>Air</a:t>
+            </a:r>
+            <a:r>
+              <a:rPr lang="tr-TR" sz="1600" dirty="0"/>
+              <a:t> </a:t>
+            </a:r>
+            <a:r>
+              <a:rPr lang="tr-TR" sz="1600" dirty="0" err="1"/>
+              <a:t>gap</a:t>
+            </a:r>
+            <a:r>
+              <a:rPr lang="tr-TR" sz="1600" dirty="0"/>
+              <a:t> </a:t>
+            </a:r>
+            <a:r>
+              <a:rPr lang="tr-TR" sz="1600" dirty="0" err="1"/>
+              <a:t>vs</a:t>
+            </a:r>
+            <a:r>
+              <a:rPr lang="tr-TR" sz="1600" dirty="0"/>
+              <a:t> AL </a:t>
+            </a:r>
+            <a:r>
+              <a:rPr lang="tr-TR" sz="1600" dirty="0" err="1"/>
+              <a:t>value</a:t>
+            </a:r>
+            <a:r>
+              <a:rPr lang="tr-TR" sz="1600" dirty="0"/>
+              <a:t> </a:t>
+            </a:r>
+            <a:r>
+              <a:rPr lang="tr-TR" sz="1600" dirty="0" err="1"/>
+              <a:t>Graphs</a:t>
+            </a:r>
+            <a:endParaRPr lang="en-US" sz="1200" dirty="0"/>
+          </a:p>
+        </p:txBody>
+      </p:sp>
     </p:spTree>
     <p:extLst>
       <p:ext uri="{BB962C8B-B14F-4D97-AF65-F5344CB8AC3E}">
@@ -13873,7 +13962,7 @@
             </a:r>
             <a:r>
               <a:rPr lang="tr-TR" sz="1400" dirty="0"/>
-              <a:t>. X </a:t>
+              <a:t>. 2 </a:t>
             </a:r>
             <a:r>
               <a:rPr lang="tr-TR" sz="1200" dirty="0" err="1"/>
@@ -16293,7 +16382,7 @@
           <a:p>
             <a:r>
               <a:rPr lang="tr-TR" b="1" dirty="0"/>
-              <a:t>Figure-X:</a:t>
+              <a:t>Figure-6:</a:t>
             </a:r>
           </a:p>
           <a:p>
@@ -21288,7 +21377,7 @@
             </a:r>
             <a:r>
               <a:rPr lang="tr-TR" sz="1400" dirty="0"/>
-              <a:t>. X </a:t>
+              <a:t>. 7 </a:t>
             </a:r>
             <a:r>
               <a:rPr lang="tr-TR" sz="1400" dirty="0" err="1"/>
@@ -21609,7 +21698,7 @@
             </a:r>
             <a:r>
               <a:rPr lang="tr-TR" sz="1400" dirty="0"/>
-              <a:t>. X </a:t>
+              <a:t>. 8 </a:t>
             </a:r>
             <a:r>
               <a:rPr lang="en-US" sz="1200" dirty="0"/>
@@ -21934,7 +22023,7 @@
             </a:r>
             <a:r>
               <a:rPr lang="tr-TR" sz="1400" dirty="0"/>
-              <a:t>. X </a:t>
+              <a:t>. 9 </a:t>
             </a:r>
             <a:r>
               <a:rPr lang="en-US" sz="1400" dirty="0"/>
@@ -22271,7 +22360,7 @@
             </a:r>
             <a:r>
               <a:rPr lang="tr-TR" sz="1400" dirty="0"/>
-              <a:t>. X </a:t>
+              <a:t>. 10 </a:t>
             </a:r>
             <a:r>
               <a:rPr lang="en-US" sz="1200" dirty="0"/>
@@ -22612,7 +22701,7 @@
             </a:r>
             <a:r>
               <a:rPr lang="tr-TR" sz="1400" dirty="0"/>
-              <a:t>. X </a:t>
+              <a:t>. 11 </a:t>
             </a:r>
             <a:r>
               <a:rPr lang="en-US" sz="1200" dirty="0"/>
@@ -22940,7 +23029,7 @@
             </a:r>
             <a:r>
               <a:rPr lang="tr-TR" sz="1400" dirty="0"/>
-              <a:t>. X </a:t>
+              <a:t>. 12 </a:t>
             </a:r>
             <a:r>
               <a:rPr lang="en-US" sz="1200" dirty="0"/>
@@ -23268,7 +23357,7 @@
             </a:r>
             <a:r>
               <a:rPr lang="tr-TR" sz="1400" dirty="0"/>
-              <a:t>. X </a:t>
+              <a:t>. 13 </a:t>
             </a:r>
             <a:r>
               <a:rPr lang="en-US" sz="1200" dirty="0"/>
@@ -23612,7 +23701,7 @@
             </a:r>
             <a:r>
               <a:rPr lang="tr-TR" sz="1400" dirty="0"/>
-              <a:t>. X </a:t>
+              <a:t>. 14 </a:t>
             </a:r>
             <a:r>
               <a:rPr lang="en-US" sz="1200" dirty="0"/>
@@ -23956,7 +24045,7 @@
             </a:r>
             <a:r>
               <a:rPr lang="tr-TR" sz="1400" dirty="0"/>
-              <a:t>. X </a:t>
+              <a:t>. 15 </a:t>
             </a:r>
             <a:r>
               <a:rPr lang="en-US" sz="1200" dirty="0"/>
@@ -24811,7 +24900,7 @@
             </a:r>
             <a:r>
               <a:rPr lang="tr-TR" sz="1400" dirty="0"/>
-              <a:t>. X </a:t>
+              <a:t>. 16 </a:t>
             </a:r>
             <a:r>
               <a:rPr lang="tr-TR" sz="1200" dirty="0"/>
@@ -25159,7 +25248,7 @@
             </a:r>
             <a:r>
               <a:rPr lang="tr-TR" sz="1400" dirty="0"/>
-              <a:t>. X </a:t>
+              <a:t>. 17 </a:t>
             </a:r>
             <a:r>
               <a:rPr lang="tr-TR" sz="1200" dirty="0"/>
@@ -25507,7 +25596,7 @@
             </a:r>
             <a:r>
               <a:rPr lang="tr-TR" sz="1400" dirty="0"/>
-              <a:t>. X </a:t>
+              <a:t>. 18 </a:t>
             </a:r>
             <a:r>
               <a:rPr lang="en-US" sz="1200" dirty="0"/>
@@ -25835,7 +25924,7 @@
             </a:r>
             <a:r>
               <a:rPr lang="tr-TR" sz="1400" dirty="0"/>
-              <a:t>. X </a:t>
+              <a:t>. 19 </a:t>
             </a:r>
             <a:r>
               <a:rPr lang="en-US" sz="1200" dirty="0"/>
@@ -26171,7 +26260,7 @@
             </a:r>
             <a:r>
               <a:rPr lang="tr-TR" sz="1400" dirty="0"/>
-              <a:t>. X </a:t>
+              <a:t>. 20 </a:t>
             </a:r>
             <a:r>
               <a:rPr lang="en-US" sz="1200" dirty="0"/>
@@ -26515,7 +26604,7 @@
             </a:r>
             <a:r>
               <a:rPr lang="tr-TR" sz="1400" dirty="0"/>
-              <a:t>. X </a:t>
+              <a:t>. 21 </a:t>
             </a:r>
             <a:r>
               <a:rPr lang="en-US" sz="1200" dirty="0"/>
@@ -34073,7 +34162,7 @@
             </a:r>
             <a:r>
               <a:rPr lang="tr-TR" sz="1400" dirty="0"/>
-              <a:t>. X</a:t>
+              <a:t>. 1</a:t>
             </a:r>
             <a:r>
               <a:rPr lang="tr-TR" sz="1600" dirty="0"/>
@@ -34247,7 +34336,7 @@
             </a:r>
             <a:r>
               <a:rPr lang="tr-TR" sz="1400" dirty="0"/>
-              <a:t>. X</a:t>
+              <a:t>. 2</a:t>
             </a:r>
             <a:r>
               <a:rPr lang="tr-TR" sz="1600" dirty="0"/>
@@ -34437,7 +34526,7 @@
             </a:r>
             <a:r>
               <a:rPr lang="tr-TR" sz="1400" dirty="0"/>
-              <a:t>. X</a:t>
+              <a:t>. 3</a:t>
             </a:r>
             <a:r>
               <a:rPr lang="tr-TR" sz="1600" dirty="0"/>

</xml_diff>